<commit_message>
added a read me file
</commit_message>
<xml_diff>
--- a/EyeCameraSimulation_Torsion2/TestWithOpenIrisData/CalibrationReferenceFrames.pptx
+++ b/EyeCameraSimulation_Torsion2/TestWithOpenIrisData/CalibrationReferenceFrames.pptx
@@ -111,6 +111,11 @@
       </a:defRPr>
     </a:lvl9pPr>
   </p:defaultTextStyle>
+  <p:extLst>
+    <p:ext uri="{EFAFB233-063F-42B5-8137-9DF3F51BA10A}">
+      <p15:sldGuideLst xmlns:p15="http://schemas.microsoft.com/office/powerpoint/2012/main"/>
+    </p:ext>
+  </p:extLst>
 </p:presentation>
 </file>
 
@@ -470,7 +475,7 @@
           <a:p>
             <a:fld id="{982994E9-8008-45D4-A63E-DBA9E3317288}" type="datetimeFigureOut">
               <a:rPr lang="en-US" smtClean="0"/>
-              <a:t>8/1/2024</a:t>
+              <a:t>9/3/2024</a:t>
             </a:fld>
             <a:endParaRPr lang="en-US"/>
           </a:p>
@@ -668,7 +673,7 @@
           <a:p>
             <a:fld id="{982994E9-8008-45D4-A63E-DBA9E3317288}" type="datetimeFigureOut">
               <a:rPr lang="en-US" smtClean="0"/>
-              <a:t>8/1/2024</a:t>
+              <a:t>9/3/2024</a:t>
             </a:fld>
             <a:endParaRPr lang="en-US"/>
           </a:p>
@@ -876,7 +881,7 @@
           <a:p>
             <a:fld id="{982994E9-8008-45D4-A63E-DBA9E3317288}" type="datetimeFigureOut">
               <a:rPr lang="en-US" smtClean="0"/>
-              <a:t>8/1/2024</a:t>
+              <a:t>9/3/2024</a:t>
             </a:fld>
             <a:endParaRPr lang="en-US"/>
           </a:p>
@@ -1074,7 +1079,7 @@
           <a:p>
             <a:fld id="{982994E9-8008-45D4-A63E-DBA9E3317288}" type="datetimeFigureOut">
               <a:rPr lang="en-US" smtClean="0"/>
-              <a:t>8/1/2024</a:t>
+              <a:t>9/3/2024</a:t>
             </a:fld>
             <a:endParaRPr lang="en-US"/>
           </a:p>
@@ -1349,7 +1354,7 @@
           <a:p>
             <a:fld id="{982994E9-8008-45D4-A63E-DBA9E3317288}" type="datetimeFigureOut">
               <a:rPr lang="en-US" smtClean="0"/>
-              <a:t>8/1/2024</a:t>
+              <a:t>9/3/2024</a:t>
             </a:fld>
             <a:endParaRPr lang="en-US"/>
           </a:p>
@@ -1614,7 +1619,7 @@
           <a:p>
             <a:fld id="{982994E9-8008-45D4-A63E-DBA9E3317288}" type="datetimeFigureOut">
               <a:rPr lang="en-US" smtClean="0"/>
-              <a:t>8/1/2024</a:t>
+              <a:t>9/3/2024</a:t>
             </a:fld>
             <a:endParaRPr lang="en-US"/>
           </a:p>
@@ -2026,7 +2031,7 @@
           <a:p>
             <a:fld id="{982994E9-8008-45D4-A63E-DBA9E3317288}" type="datetimeFigureOut">
               <a:rPr lang="en-US" smtClean="0"/>
-              <a:t>8/1/2024</a:t>
+              <a:t>9/3/2024</a:t>
             </a:fld>
             <a:endParaRPr lang="en-US"/>
           </a:p>
@@ -2167,7 +2172,7 @@
           <a:p>
             <a:fld id="{982994E9-8008-45D4-A63E-DBA9E3317288}" type="datetimeFigureOut">
               <a:rPr lang="en-US" smtClean="0"/>
-              <a:t>8/1/2024</a:t>
+              <a:t>9/3/2024</a:t>
             </a:fld>
             <a:endParaRPr lang="en-US"/>
           </a:p>
@@ -2280,7 +2285,7 @@
           <a:p>
             <a:fld id="{982994E9-8008-45D4-A63E-DBA9E3317288}" type="datetimeFigureOut">
               <a:rPr lang="en-US" smtClean="0"/>
-              <a:t>8/1/2024</a:t>
+              <a:t>9/3/2024</a:t>
             </a:fld>
             <a:endParaRPr lang="en-US"/>
           </a:p>
@@ -2591,7 +2596,7 @@
           <a:p>
             <a:fld id="{982994E9-8008-45D4-A63E-DBA9E3317288}" type="datetimeFigureOut">
               <a:rPr lang="en-US" smtClean="0"/>
-              <a:t>8/1/2024</a:t>
+              <a:t>9/3/2024</a:t>
             </a:fld>
             <a:endParaRPr lang="en-US"/>
           </a:p>
@@ -2879,7 +2884,7 @@
           <a:p>
             <a:fld id="{982994E9-8008-45D4-A63E-DBA9E3317288}" type="datetimeFigureOut">
               <a:rPr lang="en-US" smtClean="0"/>
-              <a:t>8/1/2024</a:t>
+              <a:t>9/3/2024</a:t>
             </a:fld>
             <a:endParaRPr lang="en-US"/>
           </a:p>
@@ -3120,7 +3125,7 @@
           <a:p>
             <a:fld id="{982994E9-8008-45D4-A63E-DBA9E3317288}" type="datetimeFigureOut">
               <a:rPr lang="en-US" smtClean="0"/>
-              <a:t>8/1/2024</a:t>
+              <a:t>9/3/2024</a:t>
             </a:fld>
             <a:endParaRPr lang="en-US"/>
           </a:p>
@@ -6159,7 +6164,15 @@
           <a:bodyPr/>
           <a:lstStyle/>
           <a:p>
-            <a:endParaRPr lang="en-US"/>
+            <a:r>
+              <a:rPr lang="en-US" dirty="0"/>
+              <a:t>Data presentation in </a:t>
+            </a:r>
+            <a:r>
+              <a:rPr lang="en-US" dirty="0" err="1"/>
+              <a:t>Arume</a:t>
+            </a:r>
+            <a:endParaRPr lang="en-US" dirty="0"/>
           </a:p>
         </p:txBody>
       </p:sp>
@@ -6184,7 +6197,41 @@
           <a:bodyPr/>
           <a:lstStyle/>
           <a:p>
-            <a:endParaRPr lang="en-US"/>
+            <a:r>
+              <a:rPr lang="en-US" dirty="0"/>
+              <a:t>It is similar to the </a:t>
+            </a:r>
+            <a:r>
+              <a:rPr lang="en-US" dirty="0" err="1"/>
+              <a:t>openiris</a:t>
+            </a:r>
+            <a:r>
+              <a:rPr lang="en-US" dirty="0"/>
+              <a:t>:</a:t>
+            </a:r>
+          </a:p>
+          <a:p>
+            <a:pPr lvl="1"/>
+            <a:r>
+              <a:rPr lang="en-US" dirty="0"/>
+              <a:t>Downward is </a:t>
+            </a:r>
+            <a:r>
+              <a:rPr lang="en-US" b="1" dirty="0"/>
+              <a:t>positive</a:t>
+            </a:r>
+            <a:r>
+              <a:rPr lang="en-US" dirty="0"/>
+              <a:t> y and </a:t>
+            </a:r>
+            <a:r>
+              <a:rPr lang="en-US"/>
+              <a:t>to the </a:t>
+            </a:r>
+            <a:r>
+              <a:rPr lang="en-US" dirty="0"/>
+              <a:t>right is positive x</a:t>
+            </a:r>
           </a:p>
         </p:txBody>
       </p:sp>
@@ -6517,26 +6564,6 @@
 </file>
 
 <file path=customXml/item1.xml><?xml version="1.0" encoding="utf-8"?>
-<p:properties xmlns:p="http://schemas.microsoft.com/office/2006/metadata/properties" xmlns:xsi="http://www.w3.org/2001/XMLSchema-instance" xmlns:pc="http://schemas.microsoft.com/office/infopath/2007/PartnerControls">
-  <documentManagement>
-    <lcf76f155ced4ddcb4097134ff3c332f xmlns="a048c95d-56bc-4d9d-b7f4-f756d5a4a43b">
-      <Terms xmlns="http://schemas.microsoft.com/office/infopath/2007/PartnerControls"/>
-    </lcf76f155ced4ddcb4097134ff3c332f>
-    <TaxCatchAll xmlns="dab830d7-07ee-458a-b886-32578b44a612" xsi:nil="true"/>
-  </documentManagement>
-</p:properties>
-</file>
-
-<file path=customXml/item2.xml><?xml version="1.0" encoding="utf-8"?>
-<?mso-contentType ?>
-<FormTemplates xmlns="http://schemas.microsoft.com/sharepoint/v3/contenttype/forms">
-  <Display>DocumentLibraryForm</Display>
-  <Edit>DocumentLibraryForm</Edit>
-  <New>DocumentLibraryForm</New>
-</FormTemplates>
-</file>
-
-<file path=customXml/item3.xml><?xml version="1.0" encoding="utf-8"?>
 <ct:contentTypeSchema xmlns:ct="http://schemas.microsoft.com/office/2006/metadata/contentType" xmlns:ma="http://schemas.microsoft.com/office/2006/metadata/properties/metaAttributes" ct:_="" ma:_="" ma:contentTypeName="Document" ma:contentTypeID="0x010100CDA8567EE2FE4F4CBE3E2CEF37728AB4" ma:contentTypeVersion="18" ma:contentTypeDescription="Create a new document." ma:contentTypeScope="" ma:versionID="e7d26b699f58419488ec2a9395d27f95">
   <xsd:schema xmlns:xsd="http://www.w3.org/2001/XMLSchema" xmlns:xs="http://www.w3.org/2001/XMLSchema" xmlns:p="http://schemas.microsoft.com/office/2006/metadata/properties" xmlns:ns2="dab830d7-07ee-458a-b886-32578b44a612" xmlns:ns3="a048c95d-56bc-4d9d-b7f4-f756d5a4a43b" targetNamespace="http://schemas.microsoft.com/office/2006/metadata/properties" ma:root="true" ma:fieldsID="7ff599d4ed36994cb6c2e8fc22c54085" ns2:_="" ns3:_="">
     <xsd:import namespace="dab830d7-07ee-458a-b886-32578b44a612"/>
@@ -6791,26 +6818,27 @@
 </ct:contentTypeSchema>
 </file>
 
-<file path=customXml/itemProps1.xml><?xml version="1.0" encoding="utf-8"?>
-<ds:datastoreItem xmlns:ds="http://schemas.openxmlformats.org/officeDocument/2006/customXml" ds:itemID="{0D164948-0D3D-49B6-BB77-98E28A2F68AF}">
-  <ds:schemaRefs>
-    <ds:schemaRef ds:uri="http://schemas.microsoft.com/office/2006/metadata/properties"/>
-    <ds:schemaRef ds:uri="http://schemas.microsoft.com/office/infopath/2007/PartnerControls"/>
-    <ds:schemaRef ds:uri="a048c95d-56bc-4d9d-b7f4-f756d5a4a43b"/>
-    <ds:schemaRef ds:uri="dab830d7-07ee-458a-b886-32578b44a612"/>
-  </ds:schemaRefs>
-</ds:datastoreItem>
+<file path=customXml/item2.xml><?xml version="1.0" encoding="utf-8"?>
+<?mso-contentType ?>
+<FormTemplates xmlns="http://schemas.microsoft.com/sharepoint/v3/contenttype/forms">
+  <Display>DocumentLibraryForm</Display>
+  <Edit>DocumentLibraryForm</Edit>
+  <New>DocumentLibraryForm</New>
+</FormTemplates>
 </file>
 
-<file path=customXml/itemProps2.xml><?xml version="1.0" encoding="utf-8"?>
-<ds:datastoreItem xmlns:ds="http://schemas.openxmlformats.org/officeDocument/2006/customXml" ds:itemID="{F1EC8B9C-407B-4024-B476-E556BE3F1E6D}">
-  <ds:schemaRefs>
-    <ds:schemaRef ds:uri="http://schemas.microsoft.com/sharepoint/v3/contenttype/forms"/>
-  </ds:schemaRefs>
-</ds:datastoreItem>
+<file path=customXml/item3.xml><?xml version="1.0" encoding="utf-8"?>
+<p:properties xmlns:p="http://schemas.microsoft.com/office/2006/metadata/properties" xmlns:xsi="http://www.w3.org/2001/XMLSchema-instance" xmlns:pc="http://schemas.microsoft.com/office/infopath/2007/PartnerControls">
+  <documentManagement>
+    <lcf76f155ced4ddcb4097134ff3c332f xmlns="a048c95d-56bc-4d9d-b7f4-f756d5a4a43b">
+      <Terms xmlns="http://schemas.microsoft.com/office/infopath/2007/PartnerControls"/>
+    </lcf76f155ced4ddcb4097134ff3c332f>
+    <TaxCatchAll xmlns="dab830d7-07ee-458a-b886-32578b44a612" xsi:nil="true"/>
+  </documentManagement>
+</p:properties>
 </file>
 
-<file path=customXml/itemProps3.xml><?xml version="1.0" encoding="utf-8"?>
+<file path=customXml/itemProps1.xml><?xml version="1.0" encoding="utf-8"?>
 <ds:datastoreItem xmlns:ds="http://schemas.openxmlformats.org/officeDocument/2006/customXml" ds:itemID="{E776D396-1A6A-4BEC-9098-8DE0C0938470}">
   <ds:schemaRefs>
     <ds:schemaRef ds:uri="http://schemas.microsoft.com/office/2006/metadata/contentType"/>
@@ -6827,4 +6855,23 @@
     <ds:schemaRef ds:uri="http://schemas.microsoft.com/internal/obd"/>
   </ds:schemaRefs>
 </ds:datastoreItem>
+</file>
+
+<file path=customXml/itemProps2.xml><?xml version="1.0" encoding="utf-8"?>
+<ds:datastoreItem xmlns:ds="http://schemas.openxmlformats.org/officeDocument/2006/customXml" ds:itemID="{F1EC8B9C-407B-4024-B476-E556BE3F1E6D}">
+  <ds:schemaRefs>
+    <ds:schemaRef ds:uri="http://schemas.microsoft.com/sharepoint/v3/contenttype/forms"/>
+  </ds:schemaRefs>
+</ds:datastoreItem>
+</file>
+
+<file path=customXml/itemProps3.xml><?xml version="1.0" encoding="utf-8"?>
+<ds:datastoreItem xmlns:ds="http://schemas.openxmlformats.org/officeDocument/2006/customXml" ds:itemID="{0D164948-0D3D-49B6-BB77-98E28A2F68AF}">
+  <ds:schemaRefs>
+    <ds:schemaRef ds:uri="http://schemas.microsoft.com/office/2006/metadata/properties"/>
+    <ds:schemaRef ds:uri="http://schemas.microsoft.com/office/infopath/2007/PartnerControls"/>
+    <ds:schemaRef ds:uri="a048c95d-56bc-4d9d-b7f4-f756d5a4a43b"/>
+    <ds:schemaRef ds:uri="dab830d7-07ee-458a-b886-32578b44a612"/>
+  </ds:schemaRefs>
+</ds:datastoreItem>
 </file>
</xml_diff>